<commit_message>
merged input from Wanting
</commit_message>
<xml_diff>
--- a/121/NMOP/nmop-interim-draft-netana-nmop-network-anomaly-semantics.pptx
+++ b/121/NMOP/nmop-interim-draft-netana-nmop-network-anomaly-semantics.pptx
@@ -130,7 +130,7 @@
   <pc:docChgLst>
     <pc:chgData name="Graf Thomas, INI-NET-VNC-HCS" userId="487bc3e3-9ce7-4cdd-b7b4-8899ea88d289" providerId="ADAL" clId="{BCADFA76-C0E3-43D8-AB70-1B70DE48F9F8}"/>
     <pc:docChg chg="undo custSel addSld modSld">
-      <pc:chgData name="Graf Thomas, INI-NET-VNC-HCS" userId="487bc3e3-9ce7-4cdd-b7b4-8899ea88d289" providerId="ADAL" clId="{BCADFA76-C0E3-43D8-AB70-1B70DE48F9F8}" dt="2024-09-06T14:02:34.092" v="298" actId="20577"/>
+      <pc:chgData name="Graf Thomas, INI-NET-VNC-HCS" userId="487bc3e3-9ce7-4cdd-b7b4-8899ea88d289" providerId="ADAL" clId="{BCADFA76-C0E3-43D8-AB70-1B70DE48F9F8}" dt="2024-09-06T14:13:58.969" v="312" actId="20577"/>
       <pc:docMkLst>
         <pc:docMk/>
       </pc:docMkLst>
@@ -158,13 +158,13 @@
         </pc:spChg>
       </pc:sldChg>
       <pc:sldChg chg="modSp mod">
-        <pc:chgData name="Graf Thomas, INI-NET-VNC-HCS" userId="487bc3e3-9ce7-4cdd-b7b4-8899ea88d289" providerId="ADAL" clId="{BCADFA76-C0E3-43D8-AB70-1B70DE48F9F8}" dt="2024-09-06T14:02:34.092" v="298" actId="20577"/>
+        <pc:chgData name="Graf Thomas, INI-NET-VNC-HCS" userId="487bc3e3-9ce7-4cdd-b7b4-8899ea88d289" providerId="ADAL" clId="{BCADFA76-C0E3-43D8-AB70-1B70DE48F9F8}" dt="2024-09-06T14:13:58.969" v="312" actId="20577"/>
         <pc:sldMkLst>
           <pc:docMk/>
           <pc:sldMk cId="2578889968" sldId="26415"/>
         </pc:sldMkLst>
         <pc:spChg chg="mod">
-          <ac:chgData name="Graf Thomas, INI-NET-VNC-HCS" userId="487bc3e3-9ce7-4cdd-b7b4-8899ea88d289" providerId="ADAL" clId="{BCADFA76-C0E3-43D8-AB70-1B70DE48F9F8}" dt="2024-09-06T14:02:34.092" v="298" actId="20577"/>
+          <ac:chgData name="Graf Thomas, INI-NET-VNC-HCS" userId="487bc3e3-9ce7-4cdd-b7b4-8899ea88d289" providerId="ADAL" clId="{BCADFA76-C0E3-43D8-AB70-1B70DE48F9F8}" dt="2024-09-06T14:13:58.969" v="312" actId="20577"/>
           <ac:spMkLst>
             <pc:docMk/>
             <pc:sldMk cId="2578889968" sldId="26415"/>
@@ -6357,7 +6357,15 @@
             </a:pPr>
             <a:r>
               <a:rPr lang="en-US" sz="1700" dirty="0"/>
-              <a:t>Symptom is now a list instead of a container.</a:t>
+              <a:t>Symptom </a:t>
+            </a:r>
+            <a:r>
+              <a:rPr lang="en-US" sz="1700"/>
+              <a:t>and annotator </a:t>
+            </a:r>
+            <a:r>
+              <a:rPr lang="en-US" sz="1700" dirty="0"/>
+              <a:t>is now a list instead of a container.</a:t>
             </a:r>
           </a:p>
           <a:p>
@@ -6454,23 +6462,7 @@
                   <a:srgbClr val="FF0000"/>
                 </a:solidFill>
               </a:rPr>
-              <a:t>-&gt; Work on </a:t>
-            </a:r>
-            <a:r>
-              <a:rPr lang="en-US" sz="1700" b="1">
-                <a:solidFill>
-                  <a:srgbClr val="FF0000"/>
-                </a:solidFill>
-              </a:rPr>
-              <a:t>example implementation </a:t>
-            </a:r>
-            <a:r>
-              <a:rPr lang="en-US" sz="1700" b="1" dirty="0">
-                <a:solidFill>
-                  <a:srgbClr val="FF0000"/>
-                </a:solidFill>
-              </a:rPr>
-              <a:t>in IETF 121 hackathon.</a:t>
+              <a:t>-&gt; Work on example implementation in IETF 121 hackathon.</a:t>
             </a:r>
           </a:p>
         </p:txBody>

</xml_diff>